<commit_message>
Changeing link to våga tala
</commit_message>
<xml_diff>
--- a/Föreläsningar/Presentationsteknik.pptx
+++ b/Föreläsningar/Presentationsteknik.pptx
@@ -210,7 +210,7 @@
             <a:fld id="{D591C14E-198E-48A7-ABEC-7FB80E868E55}" type="datetimeFigureOut">
               <a:rPr lang="sv-SE" smtClean="0"/>
               <a:pPr/>
-              <a:t>2013-10-30</a:t>
+              <a:t>14-10-22</a:t>
             </a:fld>
             <a:endParaRPr lang="sv-SE"/>
           </a:p>
@@ -377,7 +377,7 @@
             <a:fld id="{188BB863-C913-48B5-BD1A-638D82A0C76B}" type="datetimeFigureOut">
               <a:rPr lang="sv-SE" smtClean="0"/>
               <a:pPr/>
-              <a:t>2013-10-30</a:t>
+              <a:t>14-10-22</a:t>
             </a:fld>
             <a:endParaRPr lang="sv-SE"/>
           </a:p>
@@ -7604,7 +7604,6 @@
               <a:rPr lang="sv-SE" sz="2800" dirty="0" smtClean="0"/>
               <a:t>Blädderblock</a:t>
             </a:r>
-            <a:endParaRPr lang="sv-SE" sz="2800" dirty="0" smtClean="0"/>
           </a:p>
           <a:p>
             <a:r>
@@ -7617,16 +7616,11 @@
               <a:rPr lang="sv-SE" sz="2800" dirty="0" smtClean="0"/>
               <a:t>Smartboard</a:t>
             </a:r>
-            <a:endParaRPr lang="sv-SE" sz="2800" dirty="0" smtClean="0"/>
           </a:p>
           <a:p>
             <a:r>
               <a:rPr lang="sv-SE" sz="2800" dirty="0" smtClean="0"/>
-              <a:t>Projektor</a:t>
-            </a:r>
-            <a:r>
-              <a:rPr lang="sv-SE" sz="2800" dirty="0" smtClean="0"/>
-              <a:t>/Dator</a:t>
+              <a:t>Projektor/Dator</a:t>
             </a:r>
           </a:p>
           <a:p>
@@ -7635,11 +7629,7 @@
           <a:p>
             <a:r>
               <a:rPr lang="sv-SE" sz="2800" dirty="0" smtClean="0"/>
-              <a:t>Digitala </a:t>
-            </a:r>
-            <a:r>
-              <a:rPr lang="sv-SE" sz="2800" dirty="0" smtClean="0"/>
-              <a:t>presentationsverktyg</a:t>
+              <a:t>Digitala presentationsverktyg</a:t>
             </a:r>
             <a:r>
               <a:rPr lang="sv-SE" sz="2800" dirty="0"/>
@@ -7659,11 +7649,7 @@
             </a:r>
             <a:r>
               <a:rPr lang="sv-SE" sz="2800" dirty="0" err="1" smtClean="0"/>
-              <a:t>Impress</a:t>
-            </a:r>
-            <a:r>
-              <a:rPr lang="sv-SE" sz="2800" dirty="0" err="1" smtClean="0"/>
-              <a:t>.js</a:t>
+              <a:t>Impress.js</a:t>
             </a:r>
             <a:r>
               <a:rPr lang="sv-SE" sz="2800" dirty="0" smtClean="0"/>
@@ -7683,11 +7669,7 @@
             </a:r>
             <a:r>
               <a:rPr lang="sv-SE" sz="2800" dirty="0" smtClean="0"/>
-              <a:t>…..</a:t>
-            </a:r>
-            <a:r>
-              <a:rPr lang="sv-SE" sz="2800" dirty="0" smtClean="0"/>
-              <a:t>) </a:t>
+              <a:t>…..) </a:t>
             </a:r>
           </a:p>
           <a:p>
@@ -9137,7 +9119,7 @@
         <p:spPr>
           <a:xfrm>
             <a:off x="3419872" y="3361556"/>
-            <a:ext cx="4572000" cy="1200329"/>
+            <a:ext cx="4572000" cy="923330"/>
           </a:xfrm>
           <a:prstGeom prst="rect">
             <a:avLst/>
@@ -9151,22 +9133,15 @@
           <a:p>
             <a:r>
               <a:rPr lang="sv-SE" dirty="0"/>
-              <a:t>http://</a:t>
+              <a:t>http://lnu.se/student/vi-hjalper-dig/studenthalsan/aktiviteter/vaga-tala-</a:t>
             </a:r>
             <a:r>
               <a:rPr lang="sv-SE" dirty="0" smtClean="0"/>
-              <a:t>lnu.se/student/stod-och-service/studenthalsan/kalmar/kurser-och-grupper</a:t>
+              <a:t>kalmar</a:t>
             </a:r>
           </a:p>
           <a:p>
             <a:endParaRPr lang="sv-SE" dirty="0"/>
-          </a:p>
-          <a:p>
-            <a:r>
-              <a:rPr lang="sv-SE" i="1" dirty="0" smtClean="0"/>
-              <a:t>VT2014</a:t>
-            </a:r>
-            <a:endParaRPr lang="sv-SE" i="1" dirty="0"/>
           </a:p>
         </p:txBody>
       </p:sp>
@@ -9869,9 +9844,6 @@
               </a:rPr>
               <a:t> Inledning</a:t>
             </a:r>
-            <a:endParaRPr lang="sv-SE" sz="3200" dirty="0" smtClean="0">
-              <a:latin typeface="Minya Nouvelle" pitchFamily="2" charset="0"/>
-            </a:endParaRPr>
           </a:p>
           <a:p>
             <a:pPr marL="342900" indent="-342900">
@@ -9884,9 +9856,6 @@
               </a:rPr>
               <a:t> Mittparti</a:t>
             </a:r>
-            <a:endParaRPr lang="sv-SE" sz="3200" dirty="0" smtClean="0">
-              <a:latin typeface="Minya Nouvelle" pitchFamily="2" charset="0"/>
-            </a:endParaRPr>
           </a:p>
           <a:p>
             <a:pPr marL="342900" indent="-342900">
@@ -9899,9 +9868,6 @@
               </a:rPr>
               <a:t> Avslutning</a:t>
             </a:r>
-            <a:endParaRPr lang="sv-SE" sz="3200" dirty="0" smtClean="0">
-              <a:latin typeface="Minya Nouvelle" pitchFamily="2" charset="0"/>
-            </a:endParaRPr>
           </a:p>
         </p:txBody>
       </p:sp>

</xml_diff>